<commit_message>
Auto commit - 2025-06-10  3:36:49.73
</commit_message>
<xml_diff>
--- a/1일차 오후 실습 캡쳐_POST(insert) PATCH(update) DELETE(delete).pptx
+++ b/1일차 오후 실습 캡쳐_POST(insert) PATCH(update) DELETE(delete).pptx
@@ -3358,8 +3358,8 @@
           <a:lstStyle/>
           <a:p>
             <a:r>
-              <a:rPr lang="en-US" altLang="ko-KR" dirty="0"/>
-              <a:t>INSERT</a:t>
+              <a:rPr lang="en-US" altLang="ko-KR"/>
+              <a:t>INSERT  </a:t>
             </a:r>
             <a:endParaRPr lang="ko-KR" altLang="en-US" dirty="0"/>
           </a:p>

</xml_diff>